<commit_message>
Add labs to REST
</commit_message>
<xml_diff>
--- a/01 - REST [RC].pptx
+++ b/01 - REST [RC].pptx
@@ -317,7 +317,7 @@
               <a:pPr>
                 <a:defRPr/>
               </a:pPr>
-              <a:t>10/22/12</a:t>
+              <a:t>10/23/12</a:t>
             </a:fld>
             <a:endParaRPr lang="en-US"/>
           </a:p>
@@ -576,7 +576,7 @@
               <a:pPr>
                 <a:defRPr/>
               </a:pPr>
-              <a:t>10/22/12</a:t>
+              <a:t>10/23/12</a:t>
             </a:fld>
             <a:endParaRPr lang="en-US"/>
           </a:p>
@@ -1538,7 +1538,7 @@
             <a:fld id="{7EF0411E-54B7-49D7-BF23-01683CC1CD67}" type="datetime1">
               <a:rPr lang="en-US" smtClean="0"/>
               <a:pPr/>
-              <a:t>10/22/12</a:t>
+              <a:t>10/23/12</a:t>
             </a:fld>
             <a:endParaRPr lang="en-US"/>
           </a:p>
@@ -1696,7 +1696,7 @@
             <a:fld id="{7EF0411E-54B7-49D7-BF23-01683CC1CD67}" type="datetime1">
               <a:rPr lang="en-US" smtClean="0"/>
               <a:pPr/>
-              <a:t>10/22/12</a:t>
+              <a:t>10/23/12</a:t>
             </a:fld>
             <a:endParaRPr lang="en-US"/>
           </a:p>
@@ -1854,7 +1854,7 @@
             <a:fld id="{7EF0411E-54B7-49D7-BF23-01683CC1CD67}" type="datetime1">
               <a:rPr lang="en-US" smtClean="0"/>
               <a:pPr/>
-              <a:t>10/22/12</a:t>
+              <a:t>10/23/12</a:t>
             </a:fld>
             <a:endParaRPr lang="en-US"/>
           </a:p>
@@ -2012,7 +2012,7 @@
             <a:fld id="{7EF0411E-54B7-49D7-BF23-01683CC1CD67}" type="datetime1">
               <a:rPr lang="en-US" smtClean="0"/>
               <a:pPr/>
-              <a:t>10/22/12</a:t>
+              <a:t>10/23/12</a:t>
             </a:fld>
             <a:endParaRPr lang="en-US"/>
           </a:p>
@@ -2170,7 +2170,7 @@
             <a:fld id="{7EF0411E-54B7-49D7-BF23-01683CC1CD67}" type="datetime1">
               <a:rPr lang="en-US" smtClean="0"/>
               <a:pPr/>
-              <a:t>10/22/12</a:t>
+              <a:t>10/23/12</a:t>
             </a:fld>
             <a:endParaRPr lang="en-US"/>
           </a:p>
@@ -2420,7 +2420,7 @@
             <a:fld id="{7EF0411E-54B7-49D7-BF23-01683CC1CD67}" type="datetime1">
               <a:rPr lang="en-US" smtClean="0"/>
               <a:pPr/>
-              <a:t>10/22/12</a:t>
+              <a:t>10/23/12</a:t>
             </a:fld>
             <a:endParaRPr lang="en-US"/>
           </a:p>
@@ -2578,7 +2578,7 @@
             <a:fld id="{7EF0411E-54B7-49D7-BF23-01683CC1CD67}" type="datetime1">
               <a:rPr lang="en-US" smtClean="0"/>
               <a:pPr/>
-              <a:t>10/22/12</a:t>
+              <a:t>10/23/12</a:t>
             </a:fld>
             <a:endParaRPr lang="en-US"/>
           </a:p>
@@ -2736,7 +2736,7 @@
             <a:fld id="{7EF0411E-54B7-49D7-BF23-01683CC1CD67}" type="datetime1">
               <a:rPr lang="en-US" smtClean="0"/>
               <a:pPr/>
-              <a:t>10/22/12</a:t>
+              <a:t>10/23/12</a:t>
             </a:fld>
             <a:endParaRPr lang="en-US"/>
           </a:p>
@@ -2894,7 +2894,7 @@
             <a:fld id="{7EF0411E-54B7-49D7-BF23-01683CC1CD67}" type="datetime1">
               <a:rPr lang="en-US" smtClean="0"/>
               <a:pPr/>
-              <a:t>10/22/12</a:t>
+              <a:t>10/23/12</a:t>
             </a:fld>
             <a:endParaRPr lang="en-US"/>
           </a:p>
@@ -3052,7 +3052,7 @@
             <a:fld id="{7EF0411E-54B7-49D7-BF23-01683CC1CD67}" type="datetime1">
               <a:rPr lang="en-US" smtClean="0"/>
               <a:pPr/>
-              <a:t>10/22/12</a:t>
+              <a:t>10/23/12</a:t>
             </a:fld>
             <a:endParaRPr lang="en-US"/>
           </a:p>
@@ -3210,7 +3210,7 @@
             <a:fld id="{7EF0411E-54B7-49D7-BF23-01683CC1CD67}" type="datetime1">
               <a:rPr lang="en-US" smtClean="0"/>
               <a:pPr/>
-              <a:t>10/22/12</a:t>
+              <a:t>10/23/12</a:t>
             </a:fld>
             <a:endParaRPr lang="en-US"/>
           </a:p>
@@ -3368,7 +3368,7 @@
             <a:fld id="{7EF0411E-54B7-49D7-BF23-01683CC1CD67}" type="datetime1">
               <a:rPr lang="en-US" smtClean="0"/>
               <a:pPr/>
-              <a:t>10/22/12</a:t>
+              <a:t>10/23/12</a:t>
             </a:fld>
             <a:endParaRPr lang="en-US"/>
           </a:p>
@@ -3526,7 +3526,7 @@
             <a:fld id="{7EF0411E-54B7-49D7-BF23-01683CC1CD67}" type="datetime1">
               <a:rPr lang="en-US" smtClean="0"/>
               <a:pPr/>
-              <a:t>10/22/12</a:t>
+              <a:t>10/23/12</a:t>
             </a:fld>
             <a:endParaRPr lang="en-US"/>
           </a:p>
@@ -3684,7 +3684,7 @@
             <a:fld id="{7EF0411E-54B7-49D7-BF23-01683CC1CD67}" type="datetime1">
               <a:rPr lang="en-US" smtClean="0"/>
               <a:pPr/>
-              <a:t>10/22/12</a:t>
+              <a:t>10/23/12</a:t>
             </a:fld>
             <a:endParaRPr lang="en-US"/>
           </a:p>
@@ -3842,7 +3842,7 @@
             <a:fld id="{7EF0411E-54B7-49D7-BF23-01683CC1CD67}" type="datetime1">
               <a:rPr lang="en-US" smtClean="0"/>
               <a:pPr/>
-              <a:t>10/22/12</a:t>
+              <a:t>10/23/12</a:t>
             </a:fld>
             <a:endParaRPr lang="en-US"/>
           </a:p>
@@ -4000,7 +4000,7 @@
             <a:fld id="{7EF0411E-54B7-49D7-BF23-01683CC1CD67}" type="datetime1">
               <a:rPr lang="en-US" smtClean="0"/>
               <a:pPr/>
-              <a:t>10/22/12</a:t>
+              <a:t>10/23/12</a:t>
             </a:fld>
             <a:endParaRPr lang="en-US"/>
           </a:p>
@@ -4158,7 +4158,7 @@
             <a:fld id="{7EF0411E-54B7-49D7-BF23-01683CC1CD67}" type="datetime1">
               <a:rPr lang="en-US" smtClean="0"/>
               <a:pPr/>
-              <a:t>10/22/12</a:t>
+              <a:t>10/23/12</a:t>
             </a:fld>
             <a:endParaRPr lang="en-US"/>
           </a:p>
@@ -4316,7 +4316,7 @@
             <a:fld id="{7EF0411E-54B7-49D7-BF23-01683CC1CD67}" type="datetime1">
               <a:rPr lang="en-US" smtClean="0"/>
               <a:pPr/>
-              <a:t>10/22/12</a:t>
+              <a:t>10/23/12</a:t>
             </a:fld>
             <a:endParaRPr lang="en-US"/>
           </a:p>
@@ -4474,7 +4474,7 @@
             <a:fld id="{7EF0411E-54B7-49D7-BF23-01683CC1CD67}" type="datetime1">
               <a:rPr lang="en-US" smtClean="0"/>
               <a:pPr/>
-              <a:t>10/22/12</a:t>
+              <a:t>10/23/12</a:t>
             </a:fld>
             <a:endParaRPr lang="en-US"/>
           </a:p>
@@ -4632,7 +4632,7 @@
             <a:fld id="{7EF0411E-54B7-49D7-BF23-01683CC1CD67}" type="datetime1">
               <a:rPr lang="en-US" smtClean="0"/>
               <a:pPr/>
-              <a:t>10/22/12</a:t>
+              <a:t>10/23/12</a:t>
             </a:fld>
             <a:endParaRPr lang="en-US"/>
           </a:p>
@@ -4790,7 +4790,7 @@
             <a:fld id="{7EF0411E-54B7-49D7-BF23-01683CC1CD67}" type="datetime1">
               <a:rPr lang="en-US" smtClean="0"/>
               <a:pPr/>
-              <a:t>10/22/12</a:t>
+              <a:t>10/23/12</a:t>
             </a:fld>
             <a:endParaRPr lang="en-US"/>
           </a:p>
@@ -4948,7 +4948,7 @@
             <a:fld id="{7EF0411E-54B7-49D7-BF23-01683CC1CD67}" type="datetime1">
               <a:rPr lang="en-US" smtClean="0"/>
               <a:pPr/>
-              <a:t>10/22/12</a:t>
+              <a:t>10/23/12</a:t>
             </a:fld>
             <a:endParaRPr lang="en-US"/>
           </a:p>
@@ -5115,7 +5115,7 @@
             <a:fld id="{7EF0411E-54B7-49D7-BF23-01683CC1CD67}" type="datetime1">
               <a:rPr lang="en-US" smtClean="0"/>
               <a:pPr/>
-              <a:t>10/22/12</a:t>
+              <a:t>10/23/12</a:t>
             </a:fld>
             <a:endParaRPr lang="en-US"/>
           </a:p>
@@ -5273,7 +5273,7 @@
             <a:fld id="{7EF0411E-54B7-49D7-BF23-01683CC1CD67}" type="datetime1">
               <a:rPr lang="en-US" smtClean="0"/>
               <a:pPr/>
-              <a:t>10/22/12</a:t>
+              <a:t>10/23/12</a:t>
             </a:fld>
             <a:endParaRPr lang="en-US"/>
           </a:p>
@@ -5431,7 +5431,7 @@
             <a:fld id="{7EF0411E-54B7-49D7-BF23-01683CC1CD67}" type="datetime1">
               <a:rPr lang="en-US" smtClean="0"/>
               <a:pPr/>
-              <a:t>10/22/12</a:t>
+              <a:t>10/23/12</a:t>
             </a:fld>
             <a:endParaRPr lang="en-US"/>
           </a:p>
@@ -5589,7 +5589,7 @@
             <a:fld id="{7EF0411E-54B7-49D7-BF23-01683CC1CD67}" type="datetime1">
               <a:rPr lang="en-US" smtClean="0"/>
               <a:pPr/>
-              <a:t>10/22/12</a:t>
+              <a:t>10/23/12</a:t>
             </a:fld>
             <a:endParaRPr lang="en-US"/>
           </a:p>
@@ -5747,7 +5747,7 @@
             <a:fld id="{7EF0411E-54B7-49D7-BF23-01683CC1CD67}" type="datetime1">
               <a:rPr lang="en-US" smtClean="0"/>
               <a:pPr/>
-              <a:t>10/22/12</a:t>
+              <a:t>10/23/12</a:t>
             </a:fld>
             <a:endParaRPr lang="en-US"/>
           </a:p>
@@ -5926,7 +5926,7 @@
               <a:pPr>
                 <a:defRPr/>
               </a:pPr>
-              <a:t>10/22/12</a:t>
+              <a:t>10/23/12</a:t>
             </a:fld>
             <a:endParaRPr lang="en-US"/>
           </a:p>
@@ -6092,7 +6092,7 @@
             <a:fld id="{7EF0411E-54B7-49D7-BF23-01683CC1CD67}" type="datetime1">
               <a:rPr lang="en-US" smtClean="0"/>
               <a:pPr/>
-              <a:t>10/22/12</a:t>
+              <a:t>10/23/12</a:t>
             </a:fld>
             <a:endParaRPr lang="en-US"/>
           </a:p>
@@ -6250,7 +6250,7 @@
             <a:fld id="{7EF0411E-54B7-49D7-BF23-01683CC1CD67}" type="datetime1">
               <a:rPr lang="en-US" smtClean="0"/>
               <a:pPr/>
-              <a:t>10/22/12</a:t>
+              <a:t>10/23/12</a:t>
             </a:fld>
             <a:endParaRPr lang="en-US"/>
           </a:p>
@@ -6408,7 +6408,7 @@
             <a:fld id="{7EF0411E-54B7-49D7-BF23-01683CC1CD67}" type="datetime1">
               <a:rPr lang="en-US" smtClean="0"/>
               <a:pPr/>
-              <a:t>10/22/12</a:t>
+              <a:t>10/23/12</a:t>
             </a:fld>
             <a:endParaRPr lang="en-US"/>
           </a:p>
@@ -6566,7 +6566,7 @@
             <a:fld id="{7EF0411E-54B7-49D7-BF23-01683CC1CD67}" type="datetime1">
               <a:rPr lang="en-US" smtClean="0"/>
               <a:pPr/>
-              <a:t>10/22/12</a:t>
+              <a:t>10/23/12</a:t>
             </a:fld>
             <a:endParaRPr lang="en-US"/>
           </a:p>
@@ -6724,7 +6724,7 @@
             <a:fld id="{7EF0411E-54B7-49D7-BF23-01683CC1CD67}" type="datetime1">
               <a:rPr lang="en-US" smtClean="0"/>
               <a:pPr/>
-              <a:t>10/22/12</a:t>
+              <a:t>10/23/12</a:t>
             </a:fld>
             <a:endParaRPr lang="en-US"/>
           </a:p>
@@ -6882,7 +6882,7 @@
             <a:fld id="{7EF0411E-54B7-49D7-BF23-01683CC1CD67}" type="datetime1">
               <a:rPr lang="en-US" smtClean="0"/>
               <a:pPr/>
-              <a:t>10/22/12</a:t>
+              <a:t>10/23/12</a:t>
             </a:fld>
             <a:endParaRPr lang="en-US"/>
           </a:p>
@@ -7151,7 +7151,7 @@
               <a:pPr>
                 <a:defRPr/>
               </a:pPr>
-              <a:t>10/22/12</a:t>
+              <a:t>10/23/12</a:t>
             </a:fld>
             <a:endParaRPr lang="fr-FR"/>
           </a:p>
@@ -7382,7 +7382,7 @@
               <a:pPr>
                 <a:defRPr/>
               </a:pPr>
-              <a:t>10/22/12</a:t>
+              <a:t>10/23/12</a:t>
             </a:fld>
             <a:endParaRPr lang="fr-FR"/>
           </a:p>
@@ -7623,7 +7623,7 @@
               <a:pPr>
                 <a:defRPr/>
               </a:pPr>
-              <a:t>10/22/12</a:t>
+              <a:t>10/23/12</a:t>
             </a:fld>
             <a:endParaRPr lang="fr-FR"/>
           </a:p>
@@ -7887,7 +7887,7 @@
             <a:fld id="{29E81E79-DFAC-414F-9DD2-ED5820F0726F}" type="datetimeFigureOut">
               <a:rPr lang="fr-FR"/>
               <a:pPr/>
-              <a:t>10/22/12</a:t>
+              <a:t>10/23/12</a:t>
             </a:fld>
             <a:endParaRPr lang="fr-FR"/>
           </a:p>
@@ -8143,7 +8143,7 @@
             <a:fld id="{58F3536A-E70C-492D-8B6C-9516539BB90B}" type="datetimeFigureOut">
               <a:rPr lang="fr-FR"/>
               <a:pPr/>
-              <a:t>10/22/12</a:t>
+              <a:t>10/23/12</a:t>
             </a:fld>
             <a:endParaRPr lang="fr-FR"/>
           </a:p>
@@ -8404,7 +8404,7 @@
             <a:fld id="{58F3536A-E70C-492D-8B6C-9516539BB90B}" type="datetimeFigureOut">
               <a:rPr lang="fr-FR"/>
               <a:pPr/>
-              <a:t>10/22/12</a:t>
+              <a:t>10/23/12</a:t>
             </a:fld>
             <a:endParaRPr lang="fr-FR"/>
           </a:p>
@@ -8665,7 +8665,7 @@
             <a:fld id="{58F3536A-E70C-492D-8B6C-9516539BB90B}" type="datetimeFigureOut">
               <a:rPr lang="fr-FR"/>
               <a:pPr/>
-              <a:t>10/22/12</a:t>
+              <a:t>10/23/12</a:t>
             </a:fld>
             <a:endParaRPr lang="fr-FR"/>
           </a:p>
@@ -8926,7 +8926,7 @@
             <a:fld id="{58F3536A-E70C-492D-8B6C-9516539BB90B}" type="datetimeFigureOut">
               <a:rPr lang="fr-FR"/>
               <a:pPr/>
-              <a:t>10/22/12</a:t>
+              <a:t>10/23/12</a:t>
             </a:fld>
             <a:endParaRPr lang="fr-FR"/>
           </a:p>
@@ -9154,7 +9154,7 @@
               <a:pPr>
                 <a:defRPr/>
               </a:pPr>
-              <a:t>10/22/12</a:t>
+              <a:t>10/23/12</a:t>
             </a:fld>
             <a:endParaRPr lang="fr-FR"/>
           </a:p>
@@ -9461,7 +9461,7 @@
               <a:pPr>
                 <a:defRPr/>
               </a:pPr>
-              <a:t>10/22/12</a:t>
+              <a:t>10/23/12</a:t>
             </a:fld>
             <a:endParaRPr lang="fr-FR"/>
           </a:p>
@@ -9810,7 +9810,7 @@
               <a:pPr>
                 <a:defRPr/>
               </a:pPr>
-              <a:t>10/22/12</a:t>
+              <a:t>10/23/12</a:t>
             </a:fld>
             <a:endParaRPr lang="fr-FR"/>
           </a:p>
@@ -10293,7 +10293,7 @@
               <a:pPr>
                 <a:defRPr/>
               </a:pPr>
-              <a:t>10/22/12</a:t>
+              <a:t>10/23/12</a:t>
             </a:fld>
             <a:endParaRPr lang="fr-FR"/>
           </a:p>
@@ -10472,7 +10472,7 @@
               <a:pPr>
                 <a:defRPr/>
               </a:pPr>
-              <a:t>10/22/12</a:t>
+              <a:t>10/23/12</a:t>
             </a:fld>
             <a:endParaRPr lang="fr-FR"/>
           </a:p>
@@ -10628,7 +10628,7 @@
               <a:pPr>
                 <a:defRPr/>
               </a:pPr>
-              <a:t>10/22/12</a:t>
+              <a:t>10/23/12</a:t>
             </a:fld>
             <a:endParaRPr lang="fr-FR"/>
           </a:p>
@@ -10966,7 +10966,7 @@
               <a:pPr>
                 <a:defRPr/>
               </a:pPr>
-              <a:t>10/22/12</a:t>
+              <a:t>10/23/12</a:t>
             </a:fld>
             <a:endParaRPr lang="fr-FR"/>
           </a:p>
@@ -11287,7 +11287,7 @@
               <a:pPr>
                 <a:defRPr/>
               </a:pPr>
-              <a:t>10/22/12</a:t>
+              <a:t>10/23/12</a:t>
             </a:fld>
             <a:endParaRPr lang="fr-FR"/>
           </a:p>
@@ -12184,16 +12184,8 @@
               <a:t>REST, ROA, and </a:t>
             </a:r>
             <a:r>
-              <a:rPr lang="en-US" dirty="0" smtClean="0">
-                <a:solidFill>
-                  <a:srgbClr val="0C0C0C"/>
-                </a:solidFill>
-                <a:latin typeface="Verdana" charset="0"/>
-                <a:ea typeface="ＭＳ Ｐゴシック" charset="0"/>
-                <a:cs typeface="Verdana" charset="0"/>
-                <a:sym typeface="Verdana" charset="0"/>
-              </a:rPr>
-              <a:t>HATEOS</a:t>
+              <a:rPr lang="en-US" dirty="0"/>
+              <a:t>HATEOAS</a:t>
             </a:r>
             <a:endParaRPr lang="en-US" sz="1200" dirty="0" smtClean="0">
               <a:solidFill>
@@ -15892,7 +15884,6 @@
               <a:rPr lang="en-US" dirty="0" smtClean="0"/>
               <a:t>Consume Web APIs</a:t>
             </a:r>
-            <a:endParaRPr lang="en-US" dirty="0" smtClean="0"/>
           </a:p>
         </p:txBody>
       </p:sp>
@@ -20190,13 +20181,8 @@
             </a:pPr>
             <a:r>
               <a:rPr lang="en-US" dirty="0" smtClean="0"/>
-              <a:t>Course’s plan</a:t>
-            </a:r>
-            <a:r>
-              <a:rPr lang="en-US" dirty="0" smtClean="0"/>
-              <a:t>:</a:t>
-            </a:r>
-            <a:endParaRPr lang="en-US" dirty="0" smtClean="0"/>
+              <a:t>Course’s plan:</a:t>
+            </a:r>
           </a:p>
           <a:p>
             <a:pPr lvl="1"/>

</xml_diff>